<commit_message>
updated the mock up to show a box with the classes available for download
</commit_message>
<xml_diff>
--- a/Presentation Slides/Project-Plan.pptx
+++ b/Presentation Slides/Project-Plan.pptx
@@ -3763,10 +3763,6 @@
               <a:rPr lang="en-US" i="1" dirty="0" smtClean="0"/>
               <a:t>crum Master </a:t>
             </a:r>
-            <a:r>
-              <a:rPr lang="en-US" i="1" dirty="0" smtClean="0"/>
-              <a:t/>
-            </a:r>
             <a:br>
               <a:rPr lang="en-US" i="1" dirty="0" smtClean="0"/>
             </a:br>
@@ -3856,11 +3852,7 @@
           <a:p>
             <a:r>
               <a:rPr lang="en-US" dirty="0" smtClean="0"/>
-              <a:t>My </a:t>
-            </a:r>
-            <a:r>
-              <a:rPr lang="en-US" dirty="0" smtClean="0"/>
-              <a:t>Plan</a:t>
+              <a:t>My Plan</a:t>
             </a:r>
             <a:endParaRPr lang="en-US" dirty="0"/>
           </a:p>
@@ -3887,16 +3879,11 @@
               <a:rPr lang="en-US" i="1" dirty="0" smtClean="0"/>
               <a:t>Starting today my plan is to create in the first spring a working system. Then I could add on all extra required features</a:t>
             </a:r>
-            <a:endParaRPr lang="en-US" i="1" dirty="0" smtClean="0"/>
           </a:p>
           <a:p>
             <a:r>
               <a:rPr lang="en-US" i="1" dirty="0" smtClean="0"/>
-              <a:t>Plan B</a:t>
-            </a:r>
-            <a:r>
-              <a:rPr lang="en-US" i="1" dirty="0" smtClean="0"/>
-              <a:t>:</a:t>
+              <a:t>Plan B:</a:t>
             </a:r>
           </a:p>
           <a:p>

</xml_diff>